<commit_message>
terminado python clase 10
</commit_message>
<xml_diff>
--- a/Clase 10/[01]-Python -Librerias.pptx
+++ b/Clase 10/[01]-Python -Librerias.pptx
@@ -4300,32 +4300,11 @@
           <a:lstStyle/>
           <a:p>
             <a:r>
-              <a:rPr lang="es-PE" b="0" i="0" dirty="0" err="1">
-                <a:effectLst/>
-                <a:latin typeface="Source Code Pro"/>
-              </a:rPr>
-              <a:t>pip</a:t>
-            </a:r>
-            <a:r>
               <a:rPr lang="es-PE" b="0" i="0" dirty="0">
                 <a:effectLst/>
                 <a:latin typeface="Source Code Pro"/>
               </a:rPr>
-              <a:t> </a:t>
-            </a:r>
-            <a:r>
-              <a:rPr lang="es-PE" b="0" i="0" dirty="0" err="1">
-                <a:effectLst/>
-                <a:latin typeface="Source Code Pro"/>
-              </a:rPr>
-              <a:t>install</a:t>
-            </a:r>
-            <a:r>
-              <a:rPr lang="es-PE" b="0" i="0" dirty="0">
-                <a:effectLst/>
-                <a:latin typeface="Source Code Pro"/>
-              </a:rPr>
-              <a:t> </a:t>
+              <a:t>pip install </a:t>
             </a:r>
             <a:r>
               <a:rPr lang="es-PE" b="0" i="0" dirty="0" err="1">
@@ -6269,7 +6248,7 @@
                 <a:effectLst/>
                 <a:latin typeface="Source Code Pro"/>
               </a:rPr>
-              <a:t>X NO X pip install </a:t>
+              <a:t>pip install </a:t>
             </a:r>
             <a:r>
               <a:rPr lang="es-PE" b="0" i="0" dirty="0" err="1">
@@ -6277,6 +6256,13 @@
                 <a:latin typeface="Source Code Pro"/>
               </a:rPr>
               <a:t>googletrans</a:t>
+            </a:r>
+            <a:r>
+              <a:rPr lang="es-PE" b="0" i="0" dirty="0">
+                <a:effectLst/>
+                <a:latin typeface="Source Code Pro"/>
+              </a:rPr>
+              <a:t> (no funciona)</a:t>
             </a:r>
             <a:endParaRPr lang="es-PE" dirty="0"/>
           </a:p>

</xml_diff>